<commit_message>
atualização dos artefatos 16 e 17
</commit_message>
<xml_diff>
--- a/16 - DFD_Essencial_Para_Cada_Necessidade.pptx
+++ b/16 - DFD_Essencial_Para_Cada_Necessidade.pptx
@@ -8,6 +8,8 @@
     <p:sldId id="256" r:id="rId2"/>
     <p:sldId id="257" r:id="rId3"/>
     <p:sldId id="258" r:id="rId4"/>
+    <p:sldId id="259" r:id="rId5"/>
+    <p:sldId id="260" r:id="rId6"/>
   </p:sldIdLst>
   <p:sldSz cx="12192000" cy="6858000"/>
   <p:notesSz cx="6858000" cy="9144000"/>
@@ -261,7 +263,7 @@
           <a:p>
             <a:fld id="{8392C4FE-93D5-42CA-9E20-DAAA96C9B4D8}" type="datetimeFigureOut">
               <a:rPr lang="pt-BR" smtClean="0"/>
-              <a:t>24/09/2020</a:t>
+              <a:t>27/09/2020</a:t>
             </a:fld>
             <a:endParaRPr lang="pt-BR"/>
           </a:p>
@@ -459,7 +461,7 @@
           <a:p>
             <a:fld id="{8392C4FE-93D5-42CA-9E20-DAAA96C9B4D8}" type="datetimeFigureOut">
               <a:rPr lang="pt-BR" smtClean="0"/>
-              <a:t>24/09/2020</a:t>
+              <a:t>27/09/2020</a:t>
             </a:fld>
             <a:endParaRPr lang="pt-BR"/>
           </a:p>
@@ -667,7 +669,7 @@
           <a:p>
             <a:fld id="{8392C4FE-93D5-42CA-9E20-DAAA96C9B4D8}" type="datetimeFigureOut">
               <a:rPr lang="pt-BR" smtClean="0"/>
-              <a:t>24/09/2020</a:t>
+              <a:t>27/09/2020</a:t>
             </a:fld>
             <a:endParaRPr lang="pt-BR"/>
           </a:p>
@@ -865,7 +867,7 @@
           <a:p>
             <a:fld id="{8392C4FE-93D5-42CA-9E20-DAAA96C9B4D8}" type="datetimeFigureOut">
               <a:rPr lang="pt-BR" smtClean="0"/>
-              <a:t>24/09/2020</a:t>
+              <a:t>27/09/2020</a:t>
             </a:fld>
             <a:endParaRPr lang="pt-BR"/>
           </a:p>
@@ -1140,7 +1142,7 @@
           <a:p>
             <a:fld id="{8392C4FE-93D5-42CA-9E20-DAAA96C9B4D8}" type="datetimeFigureOut">
               <a:rPr lang="pt-BR" smtClean="0"/>
-              <a:t>24/09/2020</a:t>
+              <a:t>27/09/2020</a:t>
             </a:fld>
             <a:endParaRPr lang="pt-BR"/>
           </a:p>
@@ -1405,7 +1407,7 @@
           <a:p>
             <a:fld id="{8392C4FE-93D5-42CA-9E20-DAAA96C9B4D8}" type="datetimeFigureOut">
               <a:rPr lang="pt-BR" smtClean="0"/>
-              <a:t>24/09/2020</a:t>
+              <a:t>27/09/2020</a:t>
             </a:fld>
             <a:endParaRPr lang="pt-BR"/>
           </a:p>
@@ -1817,7 +1819,7 @@
           <a:p>
             <a:fld id="{8392C4FE-93D5-42CA-9E20-DAAA96C9B4D8}" type="datetimeFigureOut">
               <a:rPr lang="pt-BR" smtClean="0"/>
-              <a:t>24/09/2020</a:t>
+              <a:t>27/09/2020</a:t>
             </a:fld>
             <a:endParaRPr lang="pt-BR"/>
           </a:p>
@@ -1958,7 +1960,7 @@
           <a:p>
             <a:fld id="{8392C4FE-93D5-42CA-9E20-DAAA96C9B4D8}" type="datetimeFigureOut">
               <a:rPr lang="pt-BR" smtClean="0"/>
-              <a:t>24/09/2020</a:t>
+              <a:t>27/09/2020</a:t>
             </a:fld>
             <a:endParaRPr lang="pt-BR"/>
           </a:p>
@@ -2071,7 +2073,7 @@
           <a:p>
             <a:fld id="{8392C4FE-93D5-42CA-9E20-DAAA96C9B4D8}" type="datetimeFigureOut">
               <a:rPr lang="pt-BR" smtClean="0"/>
-              <a:t>24/09/2020</a:t>
+              <a:t>27/09/2020</a:t>
             </a:fld>
             <a:endParaRPr lang="pt-BR"/>
           </a:p>
@@ -2382,7 +2384,7 @@
           <a:p>
             <a:fld id="{8392C4FE-93D5-42CA-9E20-DAAA96C9B4D8}" type="datetimeFigureOut">
               <a:rPr lang="pt-BR" smtClean="0"/>
-              <a:t>24/09/2020</a:t>
+              <a:t>27/09/2020</a:t>
             </a:fld>
             <a:endParaRPr lang="pt-BR"/>
           </a:p>
@@ -2670,7 +2672,7 @@
           <a:p>
             <a:fld id="{8392C4FE-93D5-42CA-9E20-DAAA96C9B4D8}" type="datetimeFigureOut">
               <a:rPr lang="pt-BR" smtClean="0"/>
-              <a:t>24/09/2020</a:t>
+              <a:t>27/09/2020</a:t>
             </a:fld>
             <a:endParaRPr lang="pt-BR"/>
           </a:p>
@@ -2911,7 +2913,7 @@
           <a:p>
             <a:fld id="{8392C4FE-93D5-42CA-9E20-DAAA96C9B4D8}" type="datetimeFigureOut">
               <a:rPr lang="pt-BR" smtClean="0"/>
-              <a:t>24/09/2020</a:t>
+              <a:t>27/09/2020</a:t>
             </a:fld>
             <a:endParaRPr lang="pt-BR"/>
           </a:p>
@@ -3328,12 +3330,48 @@
           <a:chExt cx="0" cy="0"/>
         </a:xfrm>
       </p:grpSpPr>
+      <p:sp>
+        <p:nvSpPr>
+          <p:cNvPr id="4" name="CaixaDeTexto 3">
+            <a:extLst>
+              <a:ext uri="{FF2B5EF4-FFF2-40B4-BE49-F238E27FC236}">
+                <a16:creationId xmlns:a16="http://schemas.microsoft.com/office/drawing/2014/main" id="{29C7DC40-0DAA-4EAF-8E34-DF655A118396}"/>
+              </a:ext>
+            </a:extLst>
+          </p:cNvPr>
+          <p:cNvSpPr txBox="1"/>
+          <p:nvPr/>
+        </p:nvSpPr>
+        <p:spPr>
+          <a:xfrm>
+            <a:off x="2796208" y="229622"/>
+            <a:ext cx="6599583" cy="369332"/>
+          </a:xfrm>
+          <a:prstGeom prst="rect">
+            <a:avLst/>
+          </a:prstGeom>
+          <a:noFill/>
+        </p:spPr>
+        <p:txBody>
+          <a:bodyPr wrap="square" rtlCol="0">
+            <a:spAutoFit/>
+          </a:bodyPr>
+          <a:lstStyle/>
+          <a:p>
+            <a:pPr algn="ctr"/>
+            <a:r>
+              <a:rPr lang="pt-BR" b="1" dirty="0"/>
+              <a:t>DFD Essencial da Capacidade de Fornecer Orçamento</a:t>
+            </a:r>
+          </a:p>
+        </p:txBody>
+      </p:sp>
       <p:pic>
         <p:nvPicPr>
-          <p:cNvPr id="1026" name="Picture 2">
-            <a:extLst>
-              <a:ext uri="{FF2B5EF4-FFF2-40B4-BE49-F238E27FC236}">
-                <a16:creationId xmlns:a16="http://schemas.microsoft.com/office/drawing/2014/main" id="{FFC17AE6-9329-4204-97EA-27A2AAB9120F}"/>
+          <p:cNvPr id="1030" name="Picture 6">
+            <a:extLst>
+              <a:ext uri="{FF2B5EF4-FFF2-40B4-BE49-F238E27FC236}">
+                <a16:creationId xmlns:a16="http://schemas.microsoft.com/office/drawing/2014/main" id="{10BAB0E9-3E2A-4067-9F29-4C745A4BBB9B}"/>
               </a:ext>
             </a:extLst>
           </p:cNvPr>
@@ -3357,8 +3395,8 @@
         </p:blipFill>
         <p:spPr bwMode="auto">
           <a:xfrm>
-            <a:off x="1128198" y="689113"/>
-            <a:ext cx="10343495" cy="6086768"/>
+            <a:off x="2080590" y="598954"/>
+            <a:ext cx="8030817" cy="6259046"/>
           </a:xfrm>
           <a:prstGeom prst="rect">
             <a:avLst/>
@@ -3375,42 +3413,6 @@
           </a:extLst>
         </p:spPr>
       </p:pic>
-      <p:sp>
-        <p:nvSpPr>
-          <p:cNvPr id="4" name="CaixaDeTexto 3">
-            <a:extLst>
-              <a:ext uri="{FF2B5EF4-FFF2-40B4-BE49-F238E27FC236}">
-                <a16:creationId xmlns:a16="http://schemas.microsoft.com/office/drawing/2014/main" id="{29C7DC40-0DAA-4EAF-8E34-DF655A118396}"/>
-              </a:ext>
-            </a:extLst>
-          </p:cNvPr>
-          <p:cNvSpPr txBox="1"/>
-          <p:nvPr/>
-        </p:nvSpPr>
-        <p:spPr>
-          <a:xfrm>
-            <a:off x="2796208" y="229622"/>
-            <a:ext cx="6599583" cy="369332"/>
-          </a:xfrm>
-          <a:prstGeom prst="rect">
-            <a:avLst/>
-          </a:prstGeom>
-          <a:noFill/>
-        </p:spPr>
-        <p:txBody>
-          <a:bodyPr wrap="square" rtlCol="0">
-            <a:spAutoFit/>
-          </a:bodyPr>
-          <a:lstStyle/>
-          <a:p>
-            <a:pPr algn="ctr"/>
-            <a:r>
-              <a:rPr lang="pt-BR" b="1" dirty="0"/>
-              <a:t>DFD Essencial da Capacidade de Gerar Orçamento</a:t>
-            </a:r>
-          </a:p>
-        </p:txBody>
-      </p:sp>
     </p:spTree>
     <p:extLst>
       <p:ext uri="{BB962C8B-B14F-4D97-AF65-F5344CB8AC3E}">
@@ -3441,57 +3443,22 @@
           <a:chExt cx="0" cy="0"/>
         </a:xfrm>
       </p:grpSpPr>
-      <p:pic>
-        <p:nvPicPr>
-          <p:cNvPr id="5" name="Espaço Reservado para Conteúdo 4">
-            <a:extLst>
-              <a:ext uri="{FF2B5EF4-FFF2-40B4-BE49-F238E27FC236}">
-                <a16:creationId xmlns:a16="http://schemas.microsoft.com/office/drawing/2014/main" id="{89E03E56-B478-4093-8F45-96C5F210A8DB}"/>
-              </a:ext>
-            </a:extLst>
-          </p:cNvPr>
-          <p:cNvPicPr>
-            <a:picLocks noGrp="1" noChangeAspect="1"/>
-          </p:cNvPicPr>
-          <p:nvPr>
-            <p:ph idx="1"/>
-          </p:nvPr>
-        </p:nvPicPr>
-        <p:blipFill>
-          <a:blip r:embed="rId2">
-            <a:extLst>
-              <a:ext uri="{28A0092B-C50C-407E-A947-70E740481C1C}">
-                <a14:useLocalDpi xmlns:a14="http://schemas.microsoft.com/office/drawing/2010/main" val="0"/>
-              </a:ext>
-            </a:extLst>
-          </a:blip>
-          <a:stretch>
-            <a:fillRect/>
-          </a:stretch>
-        </p:blipFill>
+      <p:sp>
+        <p:nvSpPr>
+          <p:cNvPr id="3" name="CaixaDeTexto 2">
+            <a:extLst>
+              <a:ext uri="{FF2B5EF4-FFF2-40B4-BE49-F238E27FC236}">
+                <a16:creationId xmlns:a16="http://schemas.microsoft.com/office/drawing/2014/main" id="{D5CDC1D7-8344-4B7A-8007-39763D51FB9C}"/>
+              </a:ext>
+            </a:extLst>
+          </p:cNvPr>
+          <p:cNvSpPr txBox="1"/>
+          <p:nvPr/>
+        </p:nvSpPr>
         <p:spPr>
           <a:xfrm>
-            <a:off x="185905" y="486835"/>
-            <a:ext cx="11820190" cy="6255389"/>
-          </a:xfrm>
-        </p:spPr>
-      </p:pic>
-      <p:sp>
-        <p:nvSpPr>
-          <p:cNvPr id="3" name="CaixaDeTexto 2">
-            <a:extLst>
-              <a:ext uri="{FF2B5EF4-FFF2-40B4-BE49-F238E27FC236}">
-                <a16:creationId xmlns:a16="http://schemas.microsoft.com/office/drawing/2014/main" id="{D5CDC1D7-8344-4B7A-8007-39763D51FB9C}"/>
-              </a:ext>
-            </a:extLst>
-          </p:cNvPr>
-          <p:cNvSpPr txBox="1"/>
-          <p:nvPr/>
-        </p:nvSpPr>
-        <p:spPr>
-          <a:xfrm>
-            <a:off x="3432313" y="117503"/>
-            <a:ext cx="5327374" cy="369332"/>
+            <a:off x="2657060" y="47749"/>
+            <a:ext cx="6877879" cy="369332"/>
           </a:xfrm>
           <a:prstGeom prst="rect">
             <a:avLst/>
@@ -3507,11 +3474,58 @@
             <a:pPr algn="ctr"/>
             <a:r>
               <a:rPr lang="pt-BR" b="1" dirty="0"/>
-              <a:t>DFD Essencial da Capacidade de Fornecer Produto</a:t>
-            </a:r>
-          </a:p>
-        </p:txBody>
-      </p:sp>
+              <a:t>DFD Essencial da Capacidade de Tratar Venda do Produto</a:t>
+            </a:r>
+          </a:p>
+        </p:txBody>
+      </p:sp>
+      <p:pic>
+        <p:nvPicPr>
+          <p:cNvPr id="2050" name="Picture 2">
+            <a:extLst>
+              <a:ext uri="{FF2B5EF4-FFF2-40B4-BE49-F238E27FC236}">
+                <a16:creationId xmlns:a16="http://schemas.microsoft.com/office/drawing/2014/main" id="{62D13D71-092A-4312-BEF7-B3B88258DD0E}"/>
+              </a:ext>
+            </a:extLst>
+          </p:cNvPr>
+          <p:cNvPicPr>
+            <a:picLocks noChangeAspect="1" noChangeArrowheads="1"/>
+          </p:cNvPicPr>
+          <p:nvPr/>
+        </p:nvPicPr>
+        <p:blipFill>
+          <a:blip r:embed="rId2">
+            <a:extLst>
+              <a:ext uri="{28A0092B-C50C-407E-A947-70E740481C1C}">
+                <a14:useLocalDpi xmlns:a14="http://schemas.microsoft.com/office/drawing/2010/main" val="0"/>
+              </a:ext>
+            </a:extLst>
+          </a:blip>
+          <a:srcRect/>
+          <a:stretch>
+            <a:fillRect/>
+          </a:stretch>
+        </p:blipFill>
+        <p:spPr bwMode="auto">
+          <a:xfrm>
+            <a:off x="0" y="1099930"/>
+            <a:ext cx="12090302" cy="5208105"/>
+          </a:xfrm>
+          <a:prstGeom prst="rect">
+            <a:avLst/>
+          </a:prstGeom>
+          <a:noFill/>
+          <a:extLst>
+            <a:ext uri="{909E8E84-426E-40DD-AFC4-6F175D3DCCD1}">
+              <a14:hiddenFill xmlns:a14="http://schemas.microsoft.com/office/drawing/2010/main">
+                <a:solidFill>
+                  <a:srgbClr val="FFFFFF"/>
+                </a:solidFill>
+              </a14:hiddenFill>
+            </a:ext>
+          </a:extLst>
+        </p:spPr>
+      </p:pic>
     </p:spTree>
     <p:extLst>
       <p:ext uri="{BB962C8B-B14F-4D97-AF65-F5344CB8AC3E}">
@@ -3542,57 +3556,22 @@
           <a:chExt cx="0" cy="0"/>
         </a:xfrm>
       </p:grpSpPr>
-      <p:pic>
-        <p:nvPicPr>
-          <p:cNvPr id="5" name="Espaço Reservado para Conteúdo 4">
-            <a:extLst>
-              <a:ext uri="{FF2B5EF4-FFF2-40B4-BE49-F238E27FC236}">
-                <a16:creationId xmlns:a16="http://schemas.microsoft.com/office/drawing/2014/main" id="{2C607749-7AD5-4F3C-82FE-9310FE3513F8}"/>
-              </a:ext>
-            </a:extLst>
-          </p:cNvPr>
-          <p:cNvPicPr>
-            <a:picLocks noGrp="1" noChangeAspect="1"/>
-          </p:cNvPicPr>
-          <p:nvPr>
-            <p:ph idx="1"/>
-          </p:nvPr>
-        </p:nvPicPr>
-        <p:blipFill>
-          <a:blip r:embed="rId2">
-            <a:extLst>
-              <a:ext uri="{28A0092B-C50C-407E-A947-70E740481C1C}">
-                <a14:useLocalDpi xmlns:a14="http://schemas.microsoft.com/office/drawing/2010/main" val="0"/>
-              </a:ext>
-            </a:extLst>
-          </a:blip>
-          <a:stretch>
-            <a:fillRect/>
-          </a:stretch>
-        </p:blipFill>
+      <p:sp>
+        <p:nvSpPr>
+          <p:cNvPr id="3" name="CaixaDeTexto 2">
+            <a:extLst>
+              <a:ext uri="{FF2B5EF4-FFF2-40B4-BE49-F238E27FC236}">
+                <a16:creationId xmlns:a16="http://schemas.microsoft.com/office/drawing/2014/main" id="{0FFDD751-F605-4556-A363-5298971842F2}"/>
+              </a:ext>
+            </a:extLst>
+          </p:cNvPr>
+          <p:cNvSpPr txBox="1"/>
+          <p:nvPr/>
+        </p:nvSpPr>
         <p:spPr>
           <a:xfrm>
-            <a:off x="615197" y="474902"/>
-            <a:ext cx="11351516" cy="6383098"/>
-          </a:xfrm>
-        </p:spPr>
-      </p:pic>
-      <p:sp>
-        <p:nvSpPr>
-          <p:cNvPr id="3" name="CaixaDeTexto 2">
-            <a:extLst>
-              <a:ext uri="{FF2B5EF4-FFF2-40B4-BE49-F238E27FC236}">
-                <a16:creationId xmlns:a16="http://schemas.microsoft.com/office/drawing/2014/main" id="{0FFDD751-F605-4556-A363-5298971842F2}"/>
-              </a:ext>
-            </a:extLst>
-          </p:cNvPr>
-          <p:cNvSpPr txBox="1"/>
-          <p:nvPr/>
-        </p:nvSpPr>
-        <p:spPr>
-          <a:xfrm>
-            <a:off x="3624469" y="105570"/>
-            <a:ext cx="4909932" cy="369332"/>
+            <a:off x="2835450" y="105570"/>
+            <a:ext cx="6911010" cy="369332"/>
           </a:xfrm>
           <a:prstGeom prst="rect">
             <a:avLst/>
@@ -3605,17 +3584,291 @@
           </a:bodyPr>
           <a:lstStyle/>
           <a:p>
+            <a:pPr algn="ctr"/>
             <a:r>
               <a:rPr lang="pt-BR" b="1" dirty="0"/>
-              <a:t>DFD Essencial da Capacidade de Logística Reversa</a:t>
-            </a:r>
-          </a:p>
-        </p:txBody>
-      </p:sp>
+              <a:t>DFD Essencial da Capacidade de Tratar de Configurar Produto</a:t>
+            </a:r>
+          </a:p>
+        </p:txBody>
+      </p:sp>
+      <p:pic>
+        <p:nvPicPr>
+          <p:cNvPr id="3074" name="Picture 2">
+            <a:extLst>
+              <a:ext uri="{FF2B5EF4-FFF2-40B4-BE49-F238E27FC236}">
+                <a16:creationId xmlns:a16="http://schemas.microsoft.com/office/drawing/2014/main" id="{FB83AA70-2722-49E2-99BE-8D99E8DB3AEC}"/>
+              </a:ext>
+            </a:extLst>
+          </p:cNvPr>
+          <p:cNvPicPr>
+            <a:picLocks noChangeAspect="1" noChangeArrowheads="1"/>
+          </p:cNvPicPr>
+          <p:nvPr/>
+        </p:nvPicPr>
+        <p:blipFill>
+          <a:blip r:embed="rId2">
+            <a:extLst>
+              <a:ext uri="{28A0092B-C50C-407E-A947-70E740481C1C}">
+                <a14:useLocalDpi xmlns:a14="http://schemas.microsoft.com/office/drawing/2010/main" val="0"/>
+              </a:ext>
+            </a:extLst>
+          </a:blip>
+          <a:srcRect/>
+          <a:stretch>
+            <a:fillRect/>
+          </a:stretch>
+        </p:blipFill>
+        <p:spPr bwMode="auto">
+          <a:xfrm>
+            <a:off x="3116801" y="474902"/>
+            <a:ext cx="6348307" cy="6318168"/>
+          </a:xfrm>
+          <a:prstGeom prst="rect">
+            <a:avLst/>
+          </a:prstGeom>
+          <a:noFill/>
+          <a:extLst>
+            <a:ext uri="{909E8E84-426E-40DD-AFC4-6F175D3DCCD1}">
+              <a14:hiddenFill xmlns:a14="http://schemas.microsoft.com/office/drawing/2010/main">
+                <a:solidFill>
+                  <a:srgbClr val="FFFFFF"/>
+                </a:solidFill>
+              </a14:hiddenFill>
+            </a:ext>
+          </a:extLst>
+        </p:spPr>
+      </p:pic>
     </p:spTree>
     <p:extLst>
       <p:ext uri="{BB962C8B-B14F-4D97-AF65-F5344CB8AC3E}">
         <p14:creationId xmlns:p14="http://schemas.microsoft.com/office/powerpoint/2010/main" val="3391514402"/>
+      </p:ext>
+    </p:extLst>
+  </p:cSld>
+  <p:clrMapOvr>
+    <a:masterClrMapping/>
+  </p:clrMapOvr>
+</p:sld>
+</file>
+
+<file path=ppt/slides/slide4.xml><?xml version="1.0" encoding="utf-8"?>
+<p:sld xmlns:a="http://schemas.openxmlformats.org/drawingml/2006/main" xmlns:r="http://schemas.openxmlformats.org/officeDocument/2006/relationships" xmlns:p="http://schemas.openxmlformats.org/presentationml/2006/main">
+  <p:cSld>
+    <p:spTree>
+      <p:nvGrpSpPr>
+        <p:cNvPr id="1" name=""/>
+        <p:cNvGrpSpPr/>
+        <p:nvPr/>
+      </p:nvGrpSpPr>
+      <p:grpSpPr>
+        <a:xfrm>
+          <a:off x="0" y="0"/>
+          <a:ext cx="0" cy="0"/>
+          <a:chOff x="0" y="0"/>
+          <a:chExt cx="0" cy="0"/>
+        </a:xfrm>
+      </p:grpSpPr>
+      <p:sp>
+        <p:nvSpPr>
+          <p:cNvPr id="3" name="CaixaDeTexto 2">
+            <a:extLst>
+              <a:ext uri="{FF2B5EF4-FFF2-40B4-BE49-F238E27FC236}">
+                <a16:creationId xmlns:a16="http://schemas.microsoft.com/office/drawing/2014/main" id="{89AF5B36-DBBB-4679-96B0-216BE2603380}"/>
+              </a:ext>
+            </a:extLst>
+          </p:cNvPr>
+          <p:cNvSpPr txBox="1"/>
+          <p:nvPr/>
+        </p:nvSpPr>
+        <p:spPr>
+          <a:xfrm>
+            <a:off x="2640495" y="118822"/>
+            <a:ext cx="6911010" cy="369332"/>
+          </a:xfrm>
+          <a:prstGeom prst="rect">
+            <a:avLst/>
+          </a:prstGeom>
+          <a:noFill/>
+        </p:spPr>
+        <p:txBody>
+          <a:bodyPr wrap="square" rtlCol="0">
+            <a:spAutoFit/>
+          </a:bodyPr>
+          <a:lstStyle/>
+          <a:p>
+            <a:pPr algn="ctr"/>
+            <a:r>
+              <a:rPr lang="pt-BR" b="1" dirty="0"/>
+              <a:t>DFD Essencial da Capacidade de Tratar o Cancelamento do Contrato</a:t>
+            </a:r>
+          </a:p>
+        </p:txBody>
+      </p:sp>
+      <p:pic>
+        <p:nvPicPr>
+          <p:cNvPr id="4098" name="Picture 2">
+            <a:extLst>
+              <a:ext uri="{FF2B5EF4-FFF2-40B4-BE49-F238E27FC236}">
+                <a16:creationId xmlns:a16="http://schemas.microsoft.com/office/drawing/2014/main" id="{6AC59604-57B4-4439-83A9-07907EA4E795}"/>
+              </a:ext>
+            </a:extLst>
+          </p:cNvPr>
+          <p:cNvPicPr>
+            <a:picLocks noChangeAspect="1" noChangeArrowheads="1"/>
+          </p:cNvPicPr>
+          <p:nvPr/>
+        </p:nvPicPr>
+        <p:blipFill>
+          <a:blip r:embed="rId2">
+            <a:extLst>
+              <a:ext uri="{28A0092B-C50C-407E-A947-70E740481C1C}">
+                <a14:useLocalDpi xmlns:a14="http://schemas.microsoft.com/office/drawing/2010/main" val="0"/>
+              </a:ext>
+            </a:extLst>
+          </a:blip>
+          <a:srcRect/>
+          <a:stretch>
+            <a:fillRect/>
+          </a:stretch>
+        </p:blipFill>
+        <p:spPr bwMode="auto">
+          <a:xfrm>
+            <a:off x="532261" y="572605"/>
+            <a:ext cx="11127477" cy="6285395"/>
+          </a:xfrm>
+          <a:prstGeom prst="rect">
+            <a:avLst/>
+          </a:prstGeom>
+          <a:noFill/>
+          <a:extLst>
+            <a:ext uri="{909E8E84-426E-40DD-AFC4-6F175D3DCCD1}">
+              <a14:hiddenFill xmlns:a14="http://schemas.microsoft.com/office/drawing/2010/main">
+                <a:solidFill>
+                  <a:srgbClr val="FFFFFF"/>
+                </a:solidFill>
+              </a14:hiddenFill>
+            </a:ext>
+          </a:extLst>
+        </p:spPr>
+      </p:pic>
+    </p:spTree>
+    <p:extLst>
+      <p:ext uri="{BB962C8B-B14F-4D97-AF65-F5344CB8AC3E}">
+        <p14:creationId xmlns:p14="http://schemas.microsoft.com/office/powerpoint/2010/main" val="2759488555"/>
+      </p:ext>
+    </p:extLst>
+  </p:cSld>
+  <p:clrMapOvr>
+    <a:masterClrMapping/>
+  </p:clrMapOvr>
+</p:sld>
+</file>
+
+<file path=ppt/slides/slide5.xml><?xml version="1.0" encoding="utf-8"?>
+<p:sld xmlns:a="http://schemas.openxmlformats.org/drawingml/2006/main" xmlns:r="http://schemas.openxmlformats.org/officeDocument/2006/relationships" xmlns:p="http://schemas.openxmlformats.org/presentationml/2006/main">
+  <p:cSld>
+    <p:spTree>
+      <p:nvGrpSpPr>
+        <p:cNvPr id="1" name=""/>
+        <p:cNvGrpSpPr/>
+        <p:nvPr/>
+      </p:nvGrpSpPr>
+      <p:grpSpPr>
+        <a:xfrm>
+          <a:off x="0" y="0"/>
+          <a:ext cx="0" cy="0"/>
+          <a:chOff x="0" y="0"/>
+          <a:chExt cx="0" cy="0"/>
+        </a:xfrm>
+      </p:grpSpPr>
+      <p:sp>
+        <p:nvSpPr>
+          <p:cNvPr id="3" name="CaixaDeTexto 2">
+            <a:extLst>
+              <a:ext uri="{FF2B5EF4-FFF2-40B4-BE49-F238E27FC236}">
+                <a16:creationId xmlns:a16="http://schemas.microsoft.com/office/drawing/2014/main" id="{5E0C8174-06C0-47C9-9DB7-BD57EE6BD61C}"/>
+              </a:ext>
+            </a:extLst>
+          </p:cNvPr>
+          <p:cNvSpPr txBox="1"/>
+          <p:nvPr/>
+        </p:nvSpPr>
+        <p:spPr>
+          <a:xfrm>
+            <a:off x="2640495" y="132075"/>
+            <a:ext cx="6911010" cy="369332"/>
+          </a:xfrm>
+          <a:prstGeom prst="rect">
+            <a:avLst/>
+          </a:prstGeom>
+          <a:noFill/>
+        </p:spPr>
+        <p:txBody>
+          <a:bodyPr wrap="square" rtlCol="0">
+            <a:spAutoFit/>
+          </a:bodyPr>
+          <a:lstStyle/>
+          <a:p>
+            <a:pPr algn="ctr"/>
+            <a:r>
+              <a:rPr lang="pt-BR" b="1" dirty="0"/>
+              <a:t>DFD Essencial da Capacidade de Tratar a Manutenção do Produto</a:t>
+            </a:r>
+          </a:p>
+        </p:txBody>
+      </p:sp>
+      <p:pic>
+        <p:nvPicPr>
+          <p:cNvPr id="5122" name="Picture 2">
+            <a:extLst>
+              <a:ext uri="{FF2B5EF4-FFF2-40B4-BE49-F238E27FC236}">
+                <a16:creationId xmlns:a16="http://schemas.microsoft.com/office/drawing/2014/main" id="{614F147D-67F6-4282-B303-4B1C95E94786}"/>
+              </a:ext>
+            </a:extLst>
+          </p:cNvPr>
+          <p:cNvPicPr>
+            <a:picLocks noChangeAspect="1" noChangeArrowheads="1"/>
+          </p:cNvPicPr>
+          <p:nvPr/>
+        </p:nvPicPr>
+        <p:blipFill>
+          <a:blip r:embed="rId2">
+            <a:extLst>
+              <a:ext uri="{28A0092B-C50C-407E-A947-70E740481C1C}">
+                <a14:useLocalDpi xmlns:a14="http://schemas.microsoft.com/office/drawing/2010/main" val="0"/>
+              </a:ext>
+            </a:extLst>
+          </a:blip>
+          <a:srcRect/>
+          <a:stretch>
+            <a:fillRect/>
+          </a:stretch>
+        </p:blipFill>
+        <p:spPr bwMode="auto">
+          <a:xfrm>
+            <a:off x="1205947" y="501407"/>
+            <a:ext cx="9780105" cy="6303056"/>
+          </a:xfrm>
+          <a:prstGeom prst="rect">
+            <a:avLst/>
+          </a:prstGeom>
+          <a:noFill/>
+          <a:extLst>
+            <a:ext uri="{909E8E84-426E-40DD-AFC4-6F175D3DCCD1}">
+              <a14:hiddenFill xmlns:a14="http://schemas.microsoft.com/office/drawing/2010/main">
+                <a:solidFill>
+                  <a:srgbClr val="FFFFFF"/>
+                </a:solidFill>
+              </a14:hiddenFill>
+            </a:ext>
+          </a:extLst>
+        </p:spPr>
+      </p:pic>
+    </p:spTree>
+    <p:extLst>
+      <p:ext uri="{BB962C8B-B14F-4D97-AF65-F5344CB8AC3E}">
+        <p14:creationId xmlns:p14="http://schemas.microsoft.com/office/powerpoint/2010/main" val="2086019723"/>
       </p:ext>
     </p:extLst>
   </p:cSld>

</xml_diff>

<commit_message>
Alteração 16, novo 18 e 19
</commit_message>
<xml_diff>
--- a/16 - DFD_Essencial_Para_Cada_Necessidade.pptx
+++ b/16 - DFD_Essencial_Para_Cada_Necessidade.pptx
@@ -3479,37 +3479,24 @@
           </a:p>
         </p:txBody>
       </p:sp>
-      <p:pic>
-        <p:nvPicPr>
-          <p:cNvPr id="2050" name="Picture 2">
-            <a:extLst>
-              <a:ext uri="{FF2B5EF4-FFF2-40B4-BE49-F238E27FC236}">
-                <a16:creationId xmlns:a16="http://schemas.microsoft.com/office/drawing/2014/main" id="{62D13D71-092A-4312-BEF7-B3B88258DD0E}"/>
-              </a:ext>
-            </a:extLst>
-          </p:cNvPr>
-          <p:cNvPicPr>
-            <a:picLocks noChangeAspect="1" noChangeArrowheads="1"/>
-          </p:cNvPicPr>
+      <p:sp>
+        <p:nvSpPr>
+          <p:cNvPr id="2" name="AutoShape 2">
+            <a:extLst>
+              <a:ext uri="{FF2B5EF4-FFF2-40B4-BE49-F238E27FC236}">
+                <a16:creationId xmlns:a16="http://schemas.microsoft.com/office/drawing/2014/main" id="{F88536E0-434A-4604-818E-0D5E960C023C}"/>
+              </a:ext>
+            </a:extLst>
+          </p:cNvPr>
+          <p:cNvSpPr>
+            <a:spLocks noChangeAspect="1" noChangeArrowheads="1"/>
+          </p:cNvSpPr>
           <p:nvPr/>
-        </p:nvPicPr>
-        <p:blipFill>
-          <a:blip r:embed="rId2">
-            <a:extLst>
-              <a:ext uri="{28A0092B-C50C-407E-A947-70E740481C1C}">
-                <a14:useLocalDpi xmlns:a14="http://schemas.microsoft.com/office/drawing/2010/main" val="0"/>
-              </a:ext>
-            </a:extLst>
-          </a:blip>
-          <a:srcRect/>
-          <a:stretch>
-            <a:fillRect/>
-          </a:stretch>
-        </p:blipFill>
+        </p:nvSpPr>
         <p:spPr bwMode="auto">
           <a:xfrm>
-            <a:off x="0" y="1099930"/>
-            <a:ext cx="12090302" cy="5208105"/>
+            <a:off x="5943600" y="3276600"/>
+            <a:ext cx="2000774" cy="2000774"/>
           </a:xfrm>
           <a:prstGeom prst="rect">
             <a:avLst/>
@@ -3524,6 +3511,53 @@
               </a14:hiddenFill>
             </a:ext>
           </a:extLst>
+        </p:spPr>
+        <p:txBody>
+          <a:bodyPr vert="horz" wrap="square" lIns="91440" tIns="45720" rIns="91440" bIns="45720" numCol="1" anchor="t" anchorCtr="0" compatLnSpc="1">
+            <a:prstTxWarp prst="textNoShape">
+              <a:avLst/>
+            </a:prstTxWarp>
+          </a:bodyPr>
+          <a:lstStyle/>
+          <a:p>
+            <a:endParaRPr lang="pt-BR"/>
+          </a:p>
+        </p:txBody>
+      </p:sp>
+      <p:pic>
+        <p:nvPicPr>
+          <p:cNvPr id="8" name="Imagem 7" descr="Diagrama&#10;&#10;Descrição gerada automaticamente">
+            <a:extLst>
+              <a:ext uri="{FF2B5EF4-FFF2-40B4-BE49-F238E27FC236}">
+                <a16:creationId xmlns:a16="http://schemas.microsoft.com/office/drawing/2014/main" id="{924EA225-AE63-4348-9089-CB13E3676959}"/>
+              </a:ext>
+            </a:extLst>
+          </p:cNvPr>
+          <p:cNvPicPr>
+            <a:picLocks noChangeAspect="1"/>
+          </p:cNvPicPr>
+          <p:nvPr/>
+        </p:nvPicPr>
+        <p:blipFill>
+          <a:blip r:embed="rId2">
+            <a:extLst>
+              <a:ext uri="{28A0092B-C50C-407E-A947-70E740481C1C}">
+                <a14:useLocalDpi xmlns:a14="http://schemas.microsoft.com/office/drawing/2010/main" val="0"/>
+              </a:ext>
+            </a:extLst>
+          </a:blip>
+          <a:stretch>
+            <a:fillRect/>
+          </a:stretch>
+        </p:blipFill>
+        <p:spPr>
+          <a:xfrm>
+            <a:off x="219918" y="1283516"/>
+            <a:ext cx="11752164" cy="4857225"/>
+          </a:xfrm>
+          <a:prstGeom prst="rect">
+            <a:avLst/>
+          </a:prstGeom>
         </p:spPr>
       </p:pic>
     </p:spTree>

</xml_diff>

<commit_message>
Alteração artefato 16, novo 22
</commit_message>
<xml_diff>
--- a/16 - DFD_Essencial_Para_Cada_Necessidade.pptx
+++ b/16 - DFD_Essencial_Para_Cada_Necessidade.pptx
@@ -3854,15 +3854,15 @@
       </p:sp>
       <p:pic>
         <p:nvPicPr>
-          <p:cNvPr id="5122" name="Picture 2">
-            <a:extLst>
-              <a:ext uri="{FF2B5EF4-FFF2-40B4-BE49-F238E27FC236}">
-                <a16:creationId xmlns:a16="http://schemas.microsoft.com/office/drawing/2014/main" id="{614F147D-67F6-4282-B303-4B1C95E94786}"/>
+          <p:cNvPr id="5" name="Imagem 4" descr="Diagrama&#10;&#10;Descrição gerada automaticamente">
+            <a:extLst>
+              <a:ext uri="{FF2B5EF4-FFF2-40B4-BE49-F238E27FC236}">
+                <a16:creationId xmlns:a16="http://schemas.microsoft.com/office/drawing/2014/main" id="{93A76EBF-E631-4C44-B647-B0CCD67AF244}"/>
               </a:ext>
             </a:extLst>
           </p:cNvPr>
           <p:cNvPicPr>
-            <a:picLocks noChangeAspect="1" noChangeArrowheads="1"/>
+            <a:picLocks noChangeAspect="1"/>
           </p:cNvPicPr>
           <p:nvPr/>
         </p:nvPicPr>
@@ -3874,29 +3874,18 @@
               </a:ext>
             </a:extLst>
           </a:blip>
-          <a:srcRect/>
           <a:stretch>
             <a:fillRect/>
           </a:stretch>
         </p:blipFill>
-        <p:spPr bwMode="auto">
+        <p:spPr>
           <a:xfrm>
-            <a:off x="1205947" y="501407"/>
-            <a:ext cx="9780105" cy="6303056"/>
+            <a:off x="1013791" y="445085"/>
+            <a:ext cx="10164417" cy="6208607"/>
           </a:xfrm>
           <a:prstGeom prst="rect">
             <a:avLst/>
           </a:prstGeom>
-          <a:noFill/>
-          <a:extLst>
-            <a:ext uri="{909E8E84-426E-40DD-AFC4-6F175D3DCCD1}">
-              <a14:hiddenFill xmlns:a14="http://schemas.microsoft.com/office/drawing/2010/main">
-                <a:solidFill>
-                  <a:srgbClr val="FFFFFF"/>
-                </a:solidFill>
-              </a14:hiddenFill>
-            </a:ext>
-          </a:extLst>
         </p:spPr>
       </p:pic>
     </p:spTree>

</xml_diff>